<commit_message>
Updating NServiceBus presentation to NSB 3.0
</commit_message>
<xml_diff>
--- a/KeepIntegrationSaneWithNServiceBus/Keeping Integration Sane with NServiceBus.pptx
+++ b/KeepIntegrationSaneWithNServiceBus/Keeping Integration Sane with NServiceBus.pptx
@@ -17,9 +17,9 @@
     <p:sldId id="260" r:id="rId5"/>
     <p:sldId id="261" r:id="rId6"/>
     <p:sldId id="262" r:id="rId7"/>
-    <p:sldId id="263" r:id="rId8"/>
-    <p:sldId id="264" r:id="rId9"/>
-    <p:sldId id="265" r:id="rId10"/>
+    <p:sldId id="265" r:id="rId8"/>
+    <p:sldId id="263" r:id="rId9"/>
+    <p:sldId id="264" r:id="rId10"/>
   </p:sldIdLst>
   <p:sldSz cx="9144000" cy="6858000" type="screen4x3"/>
   <p:notesSz cx="6858000" cy="9144000"/>
@@ -203,7 +203,7 @@
           <a:p>
             <a:fld id="{07B9A7F0-4EAA-4868-A40D-08B60601842D}" type="datetimeFigureOut">
               <a:rPr lang="en-US" smtClean="0"/>
-              <a:t>8/19/2011</a:t>
+              <a:t>3/9/2012</a:t>
             </a:fld>
             <a:endParaRPr lang="en-US"/>
           </a:p>
@@ -368,7 +368,7 @@
           <a:p>
             <a:fld id="{E19A117A-C739-44B9-A6D7-AC2FEB1C1ECC}" type="datetimeFigureOut">
               <a:rPr lang="en-US" smtClean="0"/>
-              <a:t>8/19/2011</a:t>
+              <a:t>3/9/2012</a:t>
             </a:fld>
             <a:endParaRPr lang="en-US"/>
           </a:p>
@@ -2673,8 +2673,9 @@
           <a:p>
             <a:r>
               <a:rPr lang="en-US" dirty="0" smtClean="0"/>
-              <a:t>jimmy@headspring.com</a:t>
-            </a:r>
+              <a:t>http://jimmybogard.lostechies.com</a:t>
+            </a:r>
+            <a:endParaRPr lang="en-US" dirty="0" smtClean="0"/>
           </a:p>
           <a:p>
             <a:r>
@@ -2699,6 +2700,13 @@
   <p:clrMapOvr>
     <a:masterClrMapping/>
   </p:clrMapOvr>
+  <p:timing>
+    <p:tnLst>
+      <p:par>
+        <p:cTn id="1" dur="indefinite" restart="never" nodeType="tmRoot"/>
+      </p:par>
+    </p:tnLst>
+  </p:timing>
 </p:sld>
 </file>
 
@@ -2809,6 +2817,13 @@
   <p:clrMapOvr>
     <a:masterClrMapping/>
   </p:clrMapOvr>
+  <p:timing>
+    <p:tnLst>
+      <p:par>
+        <p:cTn id="1" dur="indefinite" restart="never" nodeType="tmRoot"/>
+      </p:par>
+    </p:tnLst>
+  </p:timing>
 </p:sld>
 </file>
 
@@ -2919,6 +2934,13 @@
   <p:clrMapOvr>
     <a:masterClrMapping/>
   </p:clrMapOvr>
+  <p:timing>
+    <p:tnLst>
+      <p:par>
+        <p:cTn id="1" dur="indefinite" restart="never" nodeType="tmRoot"/>
+      </p:par>
+    </p:tnLst>
+  </p:timing>
 </p:sld>
 </file>
 
@@ -3060,6 +3082,13 @@
   <p:clrMapOvr>
     <a:masterClrMapping/>
   </p:clrMapOvr>
+  <p:timing>
+    <p:tnLst>
+      <p:par>
+        <p:cTn id="1" dur="indefinite" restart="never" nodeType="tmRoot"/>
+      </p:par>
+    </p:tnLst>
+  </p:timing>
 </p:sld>
 </file>
 
@@ -3196,6 +3225,13 @@
   <p:clrMapOvr>
     <a:masterClrMapping/>
   </p:clrMapOvr>
+  <p:timing>
+    <p:tnLst>
+      <p:par>
+        <p:cTn id="1" dur="indefinite" restart="never" nodeType="tmRoot"/>
+      </p:par>
+    </p:tnLst>
+  </p:timing>
 </p:sld>
 </file>
 
@@ -3306,6 +3342,13 @@
   <p:clrMapOvr>
     <a:masterClrMapping/>
   </p:clrMapOvr>
+  <p:timing>
+    <p:tnLst>
+      <p:par>
+        <p:cTn id="1" dur="indefinite" restart="never" nodeType="tmRoot"/>
+      </p:par>
+    </p:tnLst>
+  </p:timing>
 </p:sld>
 </file>
 
@@ -3407,7 +3450,7 @@
                   <a:schemeClr val="tx1"/>
                 </a:solidFill>
               </a:rPr>
-              <a:t>(Consuming files)</a:t>
+              <a:t>(Calling web services)</a:t>
             </a:r>
             <a:endParaRPr lang="en-US" dirty="0">
               <a:solidFill>
@@ -3420,7 +3463,7 @@
     </p:spTree>
     <p:extLst>
       <p:ext uri="{BB962C8B-B14F-4D97-AF65-F5344CB8AC3E}">
-        <p14:creationId xmlns:p14="http://schemas.microsoft.com/office/powerpoint/2010/main" val="1916877366"/>
+        <p14:creationId xmlns:p14="http://schemas.microsoft.com/office/powerpoint/2010/main" val="1572338337"/>
       </p:ext>
     </p:extLst>
   </p:cSld>
@@ -3528,7 +3571,7 @@
                   <a:schemeClr val="tx1"/>
                 </a:solidFill>
               </a:rPr>
-              <a:t>(Producing files)</a:t>
+              <a:t>(Consuming files)</a:t>
             </a:r>
             <a:endParaRPr lang="en-US" dirty="0">
               <a:solidFill>
@@ -3541,7 +3584,7 @@
     </p:spTree>
     <p:extLst>
       <p:ext uri="{BB962C8B-B14F-4D97-AF65-F5344CB8AC3E}">
-        <p14:creationId xmlns:p14="http://schemas.microsoft.com/office/powerpoint/2010/main" val="1677348715"/>
+        <p14:creationId xmlns:p14="http://schemas.microsoft.com/office/powerpoint/2010/main" val="1916877366"/>
       </p:ext>
     </p:extLst>
   </p:cSld>
@@ -3649,7 +3692,7 @@
                   <a:schemeClr val="tx1"/>
                 </a:solidFill>
               </a:rPr>
-              <a:t>(Calling web services)</a:t>
+              <a:t>(Producing files)</a:t>
             </a:r>
             <a:endParaRPr lang="en-US" dirty="0">
               <a:solidFill>
@@ -3662,7 +3705,7 @@
     </p:spTree>
     <p:extLst>
       <p:ext uri="{BB962C8B-B14F-4D97-AF65-F5344CB8AC3E}">
-        <p14:creationId xmlns:p14="http://schemas.microsoft.com/office/powerpoint/2010/main" val="1572338337"/>
+        <p14:creationId xmlns:p14="http://schemas.microsoft.com/office/powerpoint/2010/main" val="1677348715"/>
       </p:ext>
     </p:extLst>
   </p:cSld>

</xml_diff>